<commit_message>
As and CN together
</commit_message>
<xml_diff>
--- a/docs/20210518_PrepforErinMeeting.pptx
+++ b/docs/20210518_PrepforErinMeeting.pptx
@@ -5,7 +5,7 @@
     <p:sldMasterId id="2147483648" r:id="rId1"/>
   </p:sldMasterIdLst>
   <p:notesMasterIdLst>
-    <p:notesMasterId r:id="rId11"/>
+    <p:notesMasterId r:id="rId12"/>
   </p:notesMasterIdLst>
   <p:sldIdLst>
     <p:sldId id="256" r:id="rId2"/>
@@ -17,6 +17,7 @@
     <p:sldId id="263" r:id="rId8"/>
     <p:sldId id="264" r:id="rId9"/>
     <p:sldId id="265" r:id="rId10"/>
+    <p:sldId id="266" r:id="rId11"/>
   </p:sldIdLst>
   <p:sldSz cx="12192000" cy="6858000"/>
   <p:notesSz cx="6858000" cy="9144000"/>
@@ -686,7 +687,21 @@
           <a:p>
             <a:r>
               <a:rPr lang="en-US" dirty="0"/>
-              <a:t>Pumpkin seed d13C – comparison organism d13C.</a:t>
+              <a:t>Pumpkin seed d13C – comparison organism d13C = </a:t>
+            </a:r>
+            <a:r>
+              <a:rPr lang="en-US"/>
+              <a:t>values plotted</a:t>
+            </a:r>
+            <a:endParaRPr lang="en-US" dirty="0"/>
+          </a:p>
+          <a:p>
+            <a:endParaRPr lang="en-US" dirty="0"/>
+          </a:p>
+          <a:p>
+            <a:r>
+              <a:rPr lang="en-US" dirty="0"/>
+              <a:t>Each dot is a lake, so we can see how distributed the lakes are</a:t>
             </a:r>
           </a:p>
           <a:p>
@@ -788,7 +803,52 @@
           <a:p>
             <a:r>
               <a:rPr lang="en-US" dirty="0"/>
-              <a:t>This is a</a:t>
+              <a:t>This is a basic box plot of the results from lake by lake, littoral vs pelagic reliance for each fish species. This is 17 </a:t>
+            </a:r>
+            <a:r>
+              <a:rPr lang="en-US" dirty="0" err="1"/>
+              <a:t>lake_year</a:t>
+            </a:r>
+            <a:r>
+              <a:rPr lang="en-US" dirty="0"/>
+              <a:t> sampling events that had both snails and zooplankton. These are the results from a two source mixing models, for all lakes, then the results per species summarized as a box plot. </a:t>
+            </a:r>
+          </a:p>
+          <a:p>
+            <a:endParaRPr lang="en-US" dirty="0"/>
+          </a:p>
+          <a:p>
+            <a:r>
+              <a:rPr lang="en-US" dirty="0"/>
+              <a:t>Details about the mixing models:</a:t>
+            </a:r>
+          </a:p>
+          <a:p>
+            <a:pPr marL="171450" indent="-171450">
+              <a:buFontTx/>
+              <a:buChar char="-"/>
+            </a:pPr>
+            <a:r>
+              <a:rPr lang="en-US" dirty="0"/>
+              <a:t>The results were not corrected for over or under-estimated fish or endmembers, hence the &lt;0 and &gt;1 values. </a:t>
+            </a:r>
+          </a:p>
+          <a:p>
+            <a:pPr marL="171450" indent="-171450">
+              <a:buFontTx/>
+              <a:buChar char="-"/>
+            </a:pPr>
+            <a:r>
+              <a:rPr lang="en-US" dirty="0"/>
+              <a:t>“Snails” includes all snails captured from a lake, so if there was more than one type of snail (or </a:t>
+            </a:r>
+            <a:r>
+              <a:rPr lang="en-US" dirty="0" err="1"/>
+              <a:t>zoop</a:t>
+            </a:r>
+            <a:r>
+              <a:rPr lang="en-US" dirty="0"/>
+              <a:t>) then I took the mean. Alternatively, I could always choose the most enriched and depleted endmembers if more than one value is available.</a:t>
             </a:r>
           </a:p>
         </p:txBody>
@@ -875,7 +935,7 @@
           <a:p>
             <a:r>
               <a:rPr lang="en-US" dirty="0"/>
-              <a:t>Density plot to complements the boxplot, just to see how different species compare.</a:t>
+              <a:t>Density plot to complement the boxplot. Similar info, just an alternative way to look at the littoral-pelagic mixing model results it that lets compare species.</a:t>
             </a:r>
           </a:p>
         </p:txBody>
@@ -907,6 +967,93 @@
     <p:extLst>
       <p:ext uri="{BB962C8B-B14F-4D97-AF65-F5344CB8AC3E}">
         <p14:creationId xmlns:p14="http://schemas.microsoft.com/office/powerpoint/2010/main" val="2160872192"/>
+      </p:ext>
+    </p:extLst>
+  </p:cSld>
+  <p:clrMapOvr>
+    <a:masterClrMapping/>
+  </p:clrMapOvr>
+</p:notes>
+</file>
+
+<file path=ppt/notesSlides/notesSlide6.xml><?xml version="1.0" encoding="utf-8"?>
+<p:notes xmlns:a="http://schemas.openxmlformats.org/drawingml/2006/main" xmlns:r="http://schemas.openxmlformats.org/officeDocument/2006/relationships" xmlns:p="http://schemas.openxmlformats.org/presentationml/2006/main">
+  <p:cSld>
+    <p:spTree>
+      <p:nvGrpSpPr>
+        <p:cNvPr id="1" name=""/>
+        <p:cNvGrpSpPr/>
+        <p:nvPr/>
+      </p:nvGrpSpPr>
+      <p:grpSpPr>
+        <a:xfrm>
+          <a:off x="0" y="0"/>
+          <a:ext cx="0" cy="0"/>
+          <a:chOff x="0" y="0"/>
+          <a:chExt cx="0" cy="0"/>
+        </a:xfrm>
+      </p:grpSpPr>
+      <p:sp>
+        <p:nvSpPr>
+          <p:cNvPr id="2" name="Slide Image Placeholder 1"/>
+          <p:cNvSpPr>
+            <a:spLocks noGrp="1" noRot="1" noChangeAspect="1"/>
+          </p:cNvSpPr>
+          <p:nvPr>
+            <p:ph type="sldImg"/>
+          </p:nvPr>
+        </p:nvSpPr>
+        <p:spPr/>
+      </p:sp>
+      <p:sp>
+        <p:nvSpPr>
+          <p:cNvPr id="3" name="Notes Placeholder 2"/>
+          <p:cNvSpPr>
+            <a:spLocks noGrp="1"/>
+          </p:cNvSpPr>
+          <p:nvPr>
+            <p:ph type="body" idx="1"/>
+          </p:nvPr>
+        </p:nvSpPr>
+        <p:spPr/>
+        <p:txBody>
+          <a:bodyPr/>
+          <a:lstStyle/>
+          <a:p>
+            <a:r>
+              <a:rPr lang="en-US" dirty="0"/>
+              <a:t>A quick comparison of all available samples for which we have both C &amp; N isotope data and As data, just looking in one place. I think this is the most informative, and I am curious how </a:t>
+            </a:r>
+          </a:p>
+        </p:txBody>
+      </p:sp>
+      <p:sp>
+        <p:nvSpPr>
+          <p:cNvPr id="4" name="Slide Number Placeholder 3"/>
+          <p:cNvSpPr>
+            <a:spLocks noGrp="1"/>
+          </p:cNvSpPr>
+          <p:nvPr>
+            <p:ph type="sldNum" sz="quarter" idx="5"/>
+          </p:nvPr>
+        </p:nvSpPr>
+        <p:spPr/>
+        <p:txBody>
+          <a:bodyPr/>
+          <a:lstStyle/>
+          <a:p>
+            <a:fld id="{5CE0CEED-C10A-1E43-AFDE-0861C86F1B52}" type="slidenum">
+              <a:rPr lang="en-US" smtClean="0"/>
+              <a:t>10</a:t>
+            </a:fld>
+            <a:endParaRPr lang="en-US"/>
+          </a:p>
+        </p:txBody>
+      </p:sp>
+    </p:spTree>
+    <p:extLst>
+      <p:ext uri="{BB962C8B-B14F-4D97-AF65-F5344CB8AC3E}">
+        <p14:creationId xmlns:p14="http://schemas.microsoft.com/office/powerpoint/2010/main" val="461939705"/>
       </p:ext>
     </p:extLst>
   </p:cSld>
@@ -4199,6 +4346,100 @@
     <p:extLst>
       <p:ext uri="{BB962C8B-B14F-4D97-AF65-F5344CB8AC3E}">
         <p14:creationId xmlns:p14="http://schemas.microsoft.com/office/powerpoint/2010/main" val="2557979117"/>
+      </p:ext>
+    </p:extLst>
+  </p:cSld>
+  <p:clrMapOvr>
+    <a:masterClrMapping/>
+  </p:clrMapOvr>
+</p:sld>
+</file>
+
+<file path=ppt/slides/slide10.xml><?xml version="1.0" encoding="utf-8"?>
+<p:sld xmlns:a="http://schemas.openxmlformats.org/drawingml/2006/main" xmlns:r="http://schemas.openxmlformats.org/officeDocument/2006/relationships" xmlns:p="http://schemas.openxmlformats.org/presentationml/2006/main">
+  <p:cSld>
+    <p:spTree>
+      <p:nvGrpSpPr>
+        <p:cNvPr id="1" name=""/>
+        <p:cNvGrpSpPr/>
+        <p:nvPr/>
+      </p:nvGrpSpPr>
+      <p:grpSpPr>
+        <a:xfrm>
+          <a:off x="0" y="0"/>
+          <a:ext cx="0" cy="0"/>
+          <a:chOff x="0" y="0"/>
+          <a:chExt cx="0" cy="0"/>
+        </a:xfrm>
+      </p:grpSpPr>
+      <p:sp>
+        <p:nvSpPr>
+          <p:cNvPr id="2" name="Title 1">
+            <a:extLst>
+              <a:ext uri="{FF2B5EF4-FFF2-40B4-BE49-F238E27FC236}">
+                <a16:creationId xmlns:a16="http://schemas.microsoft.com/office/drawing/2014/main" id="{12A10B83-046E-034A-8A8F-782AEA4E5E30}"/>
+              </a:ext>
+            </a:extLst>
+          </p:cNvPr>
+          <p:cNvSpPr>
+            <a:spLocks noGrp="1"/>
+          </p:cNvSpPr>
+          <p:nvPr>
+            <p:ph type="title"/>
+          </p:nvPr>
+        </p:nvSpPr>
+        <p:spPr>
+          <a:xfrm>
+            <a:off x="838200" y="0"/>
+            <a:ext cx="10515600" cy="642265"/>
+          </a:xfrm>
+        </p:spPr>
+        <p:txBody>
+          <a:bodyPr>
+            <a:normAutofit fontScale="90000"/>
+          </a:bodyPr>
+          <a:lstStyle/>
+          <a:p>
+            <a:r>
+              <a:rPr lang="en-US" dirty="0"/>
+              <a:t>Combined total As µg/g &amp; stable isotopes</a:t>
+            </a:r>
+          </a:p>
+        </p:txBody>
+      </p:sp>
+      <p:pic>
+        <p:nvPicPr>
+          <p:cNvPr id="5" name="Content Placeholder 4" descr="Chart, scatter chart, bubble chart&#10;&#10;Description automatically generated">
+            <a:extLst>
+              <a:ext uri="{FF2B5EF4-FFF2-40B4-BE49-F238E27FC236}">
+                <a16:creationId xmlns:a16="http://schemas.microsoft.com/office/drawing/2014/main" id="{63E5BC94-440D-5A4E-8E0E-19AA5658013F}"/>
+              </a:ext>
+            </a:extLst>
+          </p:cNvPr>
+          <p:cNvPicPr>
+            <a:picLocks noGrp="1" noChangeAspect="1"/>
+          </p:cNvPicPr>
+          <p:nvPr>
+            <p:ph idx="1"/>
+          </p:nvPr>
+        </p:nvPicPr>
+        <p:blipFill>
+          <a:blip r:embed="rId3"/>
+          <a:stretch>
+            <a:fillRect/>
+          </a:stretch>
+        </p:blipFill>
+        <p:spPr>
+          <a:xfrm>
+            <a:off x="838200" y="649671"/>
+            <a:ext cx="10347215" cy="6208329"/>
+          </a:xfrm>
+        </p:spPr>
+      </p:pic>
+    </p:spTree>
+    <p:extLst>
+      <p:ext uri="{BB962C8B-B14F-4D97-AF65-F5344CB8AC3E}">
+        <p14:creationId xmlns:p14="http://schemas.microsoft.com/office/powerpoint/2010/main" val="4221012743"/>
       </p:ext>
     </p:extLst>
   </p:cSld>
@@ -5751,6 +5992,12 @@
               <a:t>We can try three source mixing models for a species if willing to lose a lot of information. For example, top three prey items for pumpkinseed, then go from there?</a:t>
             </a:r>
           </a:p>
+          <a:p>
+            <a:pPr marL="0" indent="0">
+              <a:buNone/>
+            </a:pPr>
+            <a:endParaRPr lang="en-US" dirty="0"/>
+          </a:p>
         </p:txBody>
       </p:sp>
     </p:spTree>
@@ -5861,27 +6108,29 @@
         </p:nvSpPr>
         <p:spPr>
           <a:xfrm>
-            <a:off x="838200" y="0"/>
+            <a:off x="3012483" y="0"/>
             <a:ext cx="6167034" cy="867905"/>
           </a:xfrm>
         </p:spPr>
         <p:txBody>
-          <a:bodyPr/>
+          <a:bodyPr>
+            <a:normAutofit/>
+          </a:bodyPr>
           <a:lstStyle/>
           <a:p>
             <a:r>
               <a:rPr lang="en-US" dirty="0"/>
-              <a:t>Pelagic vs littoral reliance</a:t>
+              <a:t>pelagic-littoral reliance</a:t>
             </a:r>
           </a:p>
         </p:txBody>
       </p:sp>
       <p:pic>
         <p:nvPicPr>
-          <p:cNvPr id="5" name="Content Placeholder 4" descr="Chart&#10;&#10;Description automatically generated with low confidence">
-            <a:extLst>
-              <a:ext uri="{FF2B5EF4-FFF2-40B4-BE49-F238E27FC236}">
-                <a16:creationId xmlns:a16="http://schemas.microsoft.com/office/drawing/2014/main" id="{CA2E4CF1-05F5-694A-B33A-678ACFEACB0E}"/>
+          <p:cNvPr id="9" name="Content Placeholder 8" descr="Diagram&#10;&#10;Description automatically generated with medium confidence">
+            <a:extLst>
+              <a:ext uri="{FF2B5EF4-FFF2-40B4-BE49-F238E27FC236}">
+                <a16:creationId xmlns:a16="http://schemas.microsoft.com/office/drawing/2014/main" id="{3B742834-22EB-7B46-8D61-A0AFCC24D1CA}"/>
               </a:ext>
             </a:extLst>
           </p:cNvPr>
@@ -5900,8 +6149,8 @@
         </p:blipFill>
         <p:spPr>
           <a:xfrm>
-            <a:off x="1208868" y="712553"/>
-            <a:ext cx="9794929" cy="5876957"/>
+            <a:off x="728420" y="745761"/>
+            <a:ext cx="10187065" cy="6112239"/>
           </a:xfrm>
         </p:spPr>
       </p:pic>

</xml_diff>